<commit_message>
Rename horoscope.com -> horoscope.example.com
Update a few other places in the text, and also update the logo in the
slides.
</commit_message>
<xml_diff>
--- a/docs/CEO_Scenario.pptx
+++ b/docs/CEO_Scenario.pptx
@@ -105,6 +105,11 @@
       </a:defRPr>
     </a:lvl9pPr>
   </p:defaultTextStyle>
+  <p:extLst>
+    <p:ext uri="{EFAFB233-063F-42B5-8137-9DF3F51BA10A}">
+      <p15:sldGuideLst xmlns:p15="http://schemas.microsoft.com/office/powerpoint/2012/main"/>
+    </p:ext>
+  </p:extLst>
 </p:presentation>
 </file>
 
@@ -255,7 +260,7 @@
           <a:p>
             <a:fld id="{515370E4-F470-1B4C-AE63-176E70C9B2F5}" type="datetimeFigureOut">
               <a:rPr lang="en-US" smtClean="0"/>
-              <a:t>11/1/21</a:t>
+              <a:t>11/5/21</a:t>
             </a:fld>
             <a:endParaRPr lang="en-US"/>
           </a:p>
@@ -453,7 +458,7 @@
           <a:p>
             <a:fld id="{515370E4-F470-1B4C-AE63-176E70C9B2F5}" type="datetimeFigureOut">
               <a:rPr lang="en-US" smtClean="0"/>
-              <a:t>11/1/21</a:t>
+              <a:t>11/5/21</a:t>
             </a:fld>
             <a:endParaRPr lang="en-US"/>
           </a:p>
@@ -661,7 +666,7 @@
           <a:p>
             <a:fld id="{515370E4-F470-1B4C-AE63-176E70C9B2F5}" type="datetimeFigureOut">
               <a:rPr lang="en-US" smtClean="0"/>
-              <a:t>11/1/21</a:t>
+              <a:t>11/5/21</a:t>
             </a:fld>
             <a:endParaRPr lang="en-US"/>
           </a:p>
@@ -859,7 +864,7 @@
           <a:p>
             <a:fld id="{515370E4-F470-1B4C-AE63-176E70C9B2F5}" type="datetimeFigureOut">
               <a:rPr lang="en-US" smtClean="0"/>
-              <a:t>11/2/21</a:t>
+              <a:t>11/5/21</a:t>
             </a:fld>
             <a:endParaRPr lang="en-US"/>
           </a:p>
@@ -919,120 +924,6 @@
           </a:p>
         </p:txBody>
       </p:sp>
-      <p:grpSp>
-        <p:nvGrpSpPr>
-          <p:cNvPr id="7" name="Group 6">
-            <a:extLst>
-              <a:ext uri="{FF2B5EF4-FFF2-40B4-BE49-F238E27FC236}">
-                <a16:creationId xmlns:a16="http://schemas.microsoft.com/office/drawing/2014/main" id="{50BC6ECC-A6EA-AA4A-8088-242A88D3D17F}"/>
-              </a:ext>
-            </a:extLst>
-          </p:cNvPr>
-          <p:cNvGrpSpPr/>
-          <p:nvPr userDrawn="1"/>
-        </p:nvGrpSpPr>
-        <p:grpSpPr>
-          <a:xfrm>
-            <a:off x="9257092" y="226305"/>
-            <a:ext cx="2644346" cy="1603202"/>
-            <a:chOff x="8909222" y="222423"/>
-            <a:chExt cx="2644346" cy="1603202"/>
-          </a:xfrm>
-        </p:grpSpPr>
-        <p:sp>
-          <p:nvSpPr>
-            <p:cNvPr id="8" name="Rectangle 7">
-              <a:extLst>
-                <a:ext uri="{FF2B5EF4-FFF2-40B4-BE49-F238E27FC236}">
-                  <a16:creationId xmlns:a16="http://schemas.microsoft.com/office/drawing/2014/main" id="{366A4B95-3AC9-1C42-A7FF-D8CDE0EF4D9D}"/>
-                </a:ext>
-              </a:extLst>
-            </p:cNvPr>
-            <p:cNvSpPr/>
-            <p:nvPr/>
-          </p:nvSpPr>
-          <p:spPr>
-            <a:xfrm>
-              <a:off x="8909222" y="222423"/>
-              <a:ext cx="2644346" cy="1603202"/>
-            </a:xfrm>
-            <a:prstGeom prst="rect">
-              <a:avLst/>
-            </a:prstGeom>
-          </p:spPr>
-          <p:style>
-            <a:lnRef idx="2">
-              <a:schemeClr val="dk1">
-                <a:shade val="50000"/>
-              </a:schemeClr>
-            </a:lnRef>
-            <a:fillRef idx="1">
-              <a:schemeClr val="dk1"/>
-            </a:fillRef>
-            <a:effectRef idx="0">
-              <a:schemeClr val="dk1"/>
-            </a:effectRef>
-            <a:fontRef idx="minor">
-              <a:schemeClr val="lt1"/>
-            </a:fontRef>
-          </p:style>
-          <p:txBody>
-            <a:bodyPr rtlCol="0" anchor="ctr"/>
-            <a:lstStyle/>
-            <a:p>
-              <a:pPr algn="ctr"/>
-              <a:endParaRPr lang="en-US"/>
-            </a:p>
-          </p:txBody>
-        </p:sp>
-        <p:pic>
-          <p:nvPicPr>
-            <p:cNvPr id="9" name="Picture 2">
-              <a:extLst>
-                <a:ext uri="{FF2B5EF4-FFF2-40B4-BE49-F238E27FC236}">
-                  <a16:creationId xmlns:a16="http://schemas.microsoft.com/office/drawing/2014/main" id="{0352E899-0DBB-DA48-A1E9-2CF45719E1E2}"/>
-                </a:ext>
-              </a:extLst>
-            </p:cNvPr>
-            <p:cNvPicPr>
-              <a:picLocks noChangeAspect="1" noChangeArrowheads="1"/>
-            </p:cNvPicPr>
-            <p:nvPr/>
-          </p:nvPicPr>
-          <p:blipFill>
-            <a:blip r:embed="rId2">
-              <a:extLst>
-                <a:ext uri="{28A0092B-C50C-407E-A947-70E740481C1C}">
-                  <a14:useLocalDpi xmlns:a14="http://schemas.microsoft.com/office/drawing/2010/main" val="0"/>
-                </a:ext>
-              </a:extLst>
-            </a:blip>
-            <a:srcRect/>
-            <a:stretch>
-              <a:fillRect/>
-            </a:stretch>
-          </p:blipFill>
-          <p:spPr bwMode="auto">
-            <a:xfrm>
-              <a:off x="9041370" y="365125"/>
-              <a:ext cx="2413000" cy="1447800"/>
-            </a:xfrm>
-            <a:prstGeom prst="rect">
-              <a:avLst/>
-            </a:prstGeom>
-            <a:noFill/>
-            <a:extLst>
-              <a:ext uri="{909E8E84-426E-40DD-AFC4-6F175D3DCCD1}">
-                <a14:hiddenFill xmlns:a14="http://schemas.microsoft.com/office/drawing/2010/main">
-                  <a:solidFill>
-                    <a:srgbClr val="FFFFFF"/>
-                  </a:solidFill>
-                </a14:hiddenFill>
-              </a:ext>
-            </a:extLst>
-          </p:spPr>
-        </p:pic>
-      </p:grpSp>
       <p:sp>
         <p:nvSpPr>
           <p:cNvPr id="10" name="TextBox 9">
@@ -1047,8 +938,8 @@
         </p:nvSpPr>
         <p:spPr>
           <a:xfrm>
-            <a:off x="9257092" y="1870075"/>
-            <a:ext cx="2644346" cy="400110"/>
+            <a:off x="9765323" y="2042427"/>
+            <a:ext cx="2344615" cy="400110"/>
           </a:xfrm>
           <a:prstGeom prst="rect">
             <a:avLst/>
@@ -1062,16 +953,42 @@
           <a:lstStyle/>
           <a:p>
             <a:r>
-              <a:rPr lang="en-US" sz="1000" i="1" dirty="0" err="1"/>
-              <a:t>Horoscope.com</a:t>
-            </a:r>
-            <a:r>
               <a:rPr lang="en-US" sz="1000" i="1" dirty="0"/>
-              <a:t> is a fictional company used in this breach assessment scenario.</a:t>
-            </a:r>
-          </a:p>
-        </p:txBody>
-      </p:sp>
+              <a:t>Horoscope is a fictional company used in this cyber breach assessment scenario.</a:t>
+            </a:r>
+          </a:p>
+        </p:txBody>
+      </p:sp>
+      <p:pic>
+        <p:nvPicPr>
+          <p:cNvPr id="14" name="Picture 13">
+            <a:extLst>
+              <a:ext uri="{FF2B5EF4-FFF2-40B4-BE49-F238E27FC236}">
+                <a16:creationId xmlns:a16="http://schemas.microsoft.com/office/drawing/2014/main" id="{87958DF7-1FE8-7448-AEC1-11D41C035AC5}"/>
+              </a:ext>
+            </a:extLst>
+          </p:cNvPr>
+          <p:cNvPicPr>
+            <a:picLocks noChangeAspect="1"/>
+          </p:cNvPicPr>
+          <p:nvPr userDrawn="1"/>
+        </p:nvPicPr>
+        <p:blipFill>
+          <a:blip r:embed="rId2"/>
+          <a:stretch>
+            <a:fillRect/>
+          </a:stretch>
+        </p:blipFill>
+        <p:spPr>
+          <a:xfrm>
+            <a:off x="9996438" y="270013"/>
+            <a:ext cx="1905000" cy="1905000"/>
+          </a:xfrm>
+          <a:prstGeom prst="rect">
+            <a:avLst/>
+          </a:prstGeom>
+        </p:spPr>
+      </p:pic>
     </p:spTree>
     <p:extLst>
       <p:ext uri="{BB962C8B-B14F-4D97-AF65-F5344CB8AC3E}">
@@ -1287,7 +1204,7 @@
           <a:p>
             <a:fld id="{515370E4-F470-1B4C-AE63-176E70C9B2F5}" type="datetimeFigureOut">
               <a:rPr lang="en-US" smtClean="0"/>
-              <a:t>11/1/21</a:t>
+              <a:t>11/5/21</a:t>
             </a:fld>
             <a:endParaRPr lang="en-US"/>
           </a:p>
@@ -1552,7 +1469,7 @@
           <a:p>
             <a:fld id="{515370E4-F470-1B4C-AE63-176E70C9B2F5}" type="datetimeFigureOut">
               <a:rPr lang="en-US" smtClean="0"/>
-              <a:t>11/1/21</a:t>
+              <a:t>11/5/21</a:t>
             </a:fld>
             <a:endParaRPr lang="en-US"/>
           </a:p>
@@ -1964,7 +1881,7 @@
           <a:p>
             <a:fld id="{515370E4-F470-1B4C-AE63-176E70C9B2F5}" type="datetimeFigureOut">
               <a:rPr lang="en-US" smtClean="0"/>
-              <a:t>11/1/21</a:t>
+              <a:t>11/5/21</a:t>
             </a:fld>
             <a:endParaRPr lang="en-US"/>
           </a:p>
@@ -2105,7 +2022,7 @@
           <a:p>
             <a:fld id="{515370E4-F470-1B4C-AE63-176E70C9B2F5}" type="datetimeFigureOut">
               <a:rPr lang="en-US" smtClean="0"/>
-              <a:t>11/1/21</a:t>
+              <a:t>11/5/21</a:t>
             </a:fld>
             <a:endParaRPr lang="en-US"/>
           </a:p>
@@ -2218,7 +2135,7 @@
           <a:p>
             <a:fld id="{515370E4-F470-1B4C-AE63-176E70C9B2F5}" type="datetimeFigureOut">
               <a:rPr lang="en-US" smtClean="0"/>
-              <a:t>11/1/21</a:t>
+              <a:t>11/5/21</a:t>
             </a:fld>
             <a:endParaRPr lang="en-US"/>
           </a:p>
@@ -2529,7 +2446,7 @@
           <a:p>
             <a:fld id="{515370E4-F470-1B4C-AE63-176E70C9B2F5}" type="datetimeFigureOut">
               <a:rPr lang="en-US" smtClean="0"/>
-              <a:t>11/1/21</a:t>
+              <a:t>11/5/21</a:t>
             </a:fld>
             <a:endParaRPr lang="en-US"/>
           </a:p>
@@ -2817,7 +2734,7 @@
           <a:p>
             <a:fld id="{515370E4-F470-1B4C-AE63-176E70C9B2F5}" type="datetimeFigureOut">
               <a:rPr lang="en-US" smtClean="0"/>
-              <a:t>11/1/21</a:t>
+              <a:t>11/5/21</a:t>
             </a:fld>
             <a:endParaRPr lang="en-US"/>
           </a:p>
@@ -3058,7 +2975,7 @@
           <a:p>
             <a:fld id="{515370E4-F470-1B4C-AE63-176E70C9B2F5}" type="datetimeFigureOut">
               <a:rPr lang="en-US" smtClean="0"/>
-              <a:t>11/1/21</a:t>
+              <a:t>11/5/21</a:t>
             </a:fld>
             <a:endParaRPr lang="en-US"/>
           </a:p>
@@ -3670,7 +3587,7 @@
             <p:ph idx="1"/>
             <p:extLst>
               <p:ext uri="{D42A27DB-BD31-4B8C-83A1-F6EECF244321}">
-                <p14:modId xmlns:p14="http://schemas.microsoft.com/office/powerpoint/2010/main" val="3089409968"/>
+                <p14:modId xmlns:p14="http://schemas.microsoft.com/office/powerpoint/2010/main" val="579874640"/>
               </p:ext>
             </p:extLst>
           </p:nvPr>
@@ -3683,7 +3600,7 @@
           <a:graphicData uri="http://schemas.openxmlformats.org/drawingml/2006/table">
             <a:tbl>
               <a:tblPr firstRow="1" firstCol="1" bandRow="1">
-                <a:tableStyleId>{073A0DAA-6AF3-43AB-8588-CEC1D06C72B9}</a:tableStyleId>
+                <a:tableStyleId>{93296810-A885-4BE3-A3E7-6D5BEEA58F35}</a:tableStyleId>
               </a:tblPr>
               <a:tblGrid>
                 <a:gridCol w="1621221">

</xml_diff>